<commit_message>
added slide for replication
</commit_message>
<xml_diff>
--- a/Project/Introduction/Project Overview.pptx
+++ b/Project/Introduction/Project Overview.pptx
@@ -9,6 +9,7 @@
     <p:sldId id="257" r:id="rId3"/>
     <p:sldId id="260" r:id="rId4"/>
     <p:sldId id="259" r:id="rId5"/>
+    <p:sldId id="261" r:id="rId6"/>
   </p:sldIdLst>
   <p:sldSz cx="12192000" cy="6858000"/>
   <p:notesSz cx="6858000" cy="9144000"/>
@@ -246,7 +247,7 @@
           <a:p>
             <a:fld id="{0EA3D039-3586-4F8F-A807-2B70F0AC2517}" type="datetimeFigureOut">
               <a:rPr lang="en-GB" smtClean="0"/>
-              <a:t>22/05/2015</a:t>
+              <a:t>23/05/2016</a:t>
             </a:fld>
             <a:endParaRPr lang="en-GB"/>
           </a:p>
@@ -416,7 +417,7 @@
           <a:p>
             <a:fld id="{0EA3D039-3586-4F8F-A807-2B70F0AC2517}" type="datetimeFigureOut">
               <a:rPr lang="en-GB" smtClean="0"/>
-              <a:t>22/05/2015</a:t>
+              <a:t>23/05/2016</a:t>
             </a:fld>
             <a:endParaRPr lang="en-GB"/>
           </a:p>
@@ -596,7 +597,7 @@
           <a:p>
             <a:fld id="{0EA3D039-3586-4F8F-A807-2B70F0AC2517}" type="datetimeFigureOut">
               <a:rPr lang="en-GB" smtClean="0"/>
-              <a:t>22/05/2015</a:t>
+              <a:t>23/05/2016</a:t>
             </a:fld>
             <a:endParaRPr lang="en-GB"/>
           </a:p>
@@ -766,7 +767,7 @@
           <a:p>
             <a:fld id="{0EA3D039-3586-4F8F-A807-2B70F0AC2517}" type="datetimeFigureOut">
               <a:rPr lang="en-GB" smtClean="0"/>
-              <a:t>22/05/2015</a:t>
+              <a:t>23/05/2016</a:t>
             </a:fld>
             <a:endParaRPr lang="en-GB"/>
           </a:p>
@@ -1012,7 +1013,7 @@
           <a:p>
             <a:fld id="{0EA3D039-3586-4F8F-A807-2B70F0AC2517}" type="datetimeFigureOut">
               <a:rPr lang="en-GB" smtClean="0"/>
-              <a:t>22/05/2015</a:t>
+              <a:t>23/05/2016</a:t>
             </a:fld>
             <a:endParaRPr lang="en-GB"/>
           </a:p>
@@ -1244,7 +1245,7 @@
           <a:p>
             <a:fld id="{0EA3D039-3586-4F8F-A807-2B70F0AC2517}" type="datetimeFigureOut">
               <a:rPr lang="en-GB" smtClean="0"/>
-              <a:t>22/05/2015</a:t>
+              <a:t>23/05/2016</a:t>
             </a:fld>
             <a:endParaRPr lang="en-GB"/>
           </a:p>
@@ -1611,7 +1612,7 @@
           <a:p>
             <a:fld id="{0EA3D039-3586-4F8F-A807-2B70F0AC2517}" type="datetimeFigureOut">
               <a:rPr lang="en-GB" smtClean="0"/>
-              <a:t>22/05/2015</a:t>
+              <a:t>23/05/2016</a:t>
             </a:fld>
             <a:endParaRPr lang="en-GB"/>
           </a:p>
@@ -1729,7 +1730,7 @@
           <a:p>
             <a:fld id="{0EA3D039-3586-4F8F-A807-2B70F0AC2517}" type="datetimeFigureOut">
               <a:rPr lang="en-GB" smtClean="0"/>
-              <a:t>22/05/2015</a:t>
+              <a:t>23/05/2016</a:t>
             </a:fld>
             <a:endParaRPr lang="en-GB"/>
           </a:p>
@@ -1824,7 +1825,7 @@
           <a:p>
             <a:fld id="{0EA3D039-3586-4F8F-A807-2B70F0AC2517}" type="datetimeFigureOut">
               <a:rPr lang="en-GB" smtClean="0"/>
-              <a:t>22/05/2015</a:t>
+              <a:t>23/05/2016</a:t>
             </a:fld>
             <a:endParaRPr lang="en-GB"/>
           </a:p>
@@ -2101,7 +2102,7 @@
           <a:p>
             <a:fld id="{0EA3D039-3586-4F8F-A807-2B70F0AC2517}" type="datetimeFigureOut">
               <a:rPr lang="en-GB" smtClean="0"/>
-              <a:t>22/05/2015</a:t>
+              <a:t>23/05/2016</a:t>
             </a:fld>
             <a:endParaRPr lang="en-GB"/>
           </a:p>
@@ -2354,7 +2355,7 @@
           <a:p>
             <a:fld id="{0EA3D039-3586-4F8F-A807-2B70F0AC2517}" type="datetimeFigureOut">
               <a:rPr lang="en-GB" smtClean="0"/>
-              <a:t>22/05/2015</a:t>
+              <a:t>23/05/2016</a:t>
             </a:fld>
             <a:endParaRPr lang="en-GB"/>
           </a:p>
@@ -2567,7 +2568,7 @@
           <a:p>
             <a:fld id="{0EA3D039-3586-4F8F-A807-2B70F0AC2517}" type="datetimeFigureOut">
               <a:rPr lang="en-GB" smtClean="0"/>
-              <a:t>22/05/2015</a:t>
+              <a:t>23/05/2016</a:t>
             </a:fld>
             <a:endParaRPr lang="en-GB"/>
           </a:p>
@@ -3024,6 +3025,13 @@
   <p:clrMapOvr>
     <a:masterClrMapping/>
   </p:clrMapOvr>
+  <p:timing>
+    <p:tnLst>
+      <p:par>
+        <p:cTn id="1" dur="indefinite" restart="never" nodeType="tmRoot"/>
+      </p:par>
+    </p:tnLst>
+  </p:timing>
 </p:sld>
 </file>
 
@@ -3282,6 +3290,13 @@
   <p:clrMapOvr>
     <a:masterClrMapping/>
   </p:clrMapOvr>
+  <p:timing>
+    <p:tnLst>
+      <p:par>
+        <p:cTn id="1" dur="indefinite" restart="never" nodeType="tmRoot"/>
+      </p:par>
+    </p:tnLst>
+  </p:timing>
 </p:sld>
 </file>
 
@@ -3520,6 +3535,13 @@
   <p:clrMapOvr>
     <a:masterClrMapping/>
   </p:clrMapOvr>
+  <p:timing>
+    <p:tnLst>
+      <p:par>
+        <p:cTn id="1" dur="indefinite" restart="never" nodeType="tmRoot"/>
+      </p:par>
+    </p:tnLst>
+  </p:timing>
 </p:sld>
 </file>
 
@@ -3832,6 +3854,214 @@
   <p:clrMapOvr>
     <a:masterClrMapping/>
   </p:clrMapOvr>
+  <p:timing>
+    <p:tnLst>
+      <p:par>
+        <p:cTn id="1" dur="indefinite" restart="never" nodeType="tmRoot"/>
+      </p:par>
+    </p:tnLst>
+  </p:timing>
+</p:sld>
+</file>
+
+<file path=ppt/slides/slide5.xml><?xml version="1.0" encoding="utf-8"?>
+<p:sld xmlns:a="http://schemas.openxmlformats.org/drawingml/2006/main" xmlns:r="http://schemas.openxmlformats.org/officeDocument/2006/relationships" xmlns:p="http://schemas.openxmlformats.org/presentationml/2006/main">
+  <p:cSld>
+    <p:spTree>
+      <p:nvGrpSpPr>
+        <p:cNvPr id="1" name=""/>
+        <p:cNvGrpSpPr/>
+        <p:nvPr/>
+      </p:nvGrpSpPr>
+      <p:grpSpPr>
+        <a:xfrm>
+          <a:off x="0" y="0"/>
+          <a:ext cx="0" cy="0"/>
+          <a:chOff x="0" y="0"/>
+          <a:chExt cx="0" cy="0"/>
+        </a:xfrm>
+      </p:grpSpPr>
+      <p:sp>
+        <p:nvSpPr>
+          <p:cNvPr id="2" name="Titel 1"/>
+          <p:cNvSpPr>
+            <a:spLocks noGrp="1"/>
+          </p:cNvSpPr>
+          <p:nvPr>
+            <p:ph type="title"/>
+          </p:nvPr>
+        </p:nvSpPr>
+        <p:spPr/>
+        <p:txBody>
+          <a:bodyPr/>
+          <a:lstStyle/>
+          <a:p>
+            <a:pPr algn="ctr"/>
+            <a:r>
+              <a:rPr lang="en-GB" dirty="0" smtClean="0"/>
+              <a:t>Replication</a:t>
+            </a:r>
+            <a:endParaRPr lang="en-GB" dirty="0"/>
+          </a:p>
+        </p:txBody>
+      </p:sp>
+      <p:sp>
+        <p:nvSpPr>
+          <p:cNvPr id="3" name="Inhaltsplatzhalter 2"/>
+          <p:cNvSpPr>
+            <a:spLocks noGrp="1"/>
+          </p:cNvSpPr>
+          <p:nvPr>
+            <p:ph idx="1"/>
+          </p:nvPr>
+        </p:nvSpPr>
+        <p:spPr/>
+        <p:txBody>
+          <a:bodyPr>
+            <a:normAutofit fontScale="92500" lnSpcReduction="10000"/>
+          </a:bodyPr>
+          <a:lstStyle/>
+          <a:p>
+            <a:r>
+              <a:rPr lang="en-GB" dirty="0" smtClean="0"/>
+              <a:t>Minimal goal: Implement a replication class which is able to replicate a given genome</a:t>
+            </a:r>
+          </a:p>
+          <a:p>
+            <a:pPr lvl="1"/>
+            <a:r>
+              <a:rPr lang="en-GB" dirty="0" smtClean="0"/>
+              <a:t>Functions: update, initiate, elongate, terminate</a:t>
+            </a:r>
+          </a:p>
+          <a:p>
+            <a:r>
+              <a:rPr lang="en-GB" dirty="0" smtClean="0"/>
+              <a:t>Additional goals:</a:t>
+            </a:r>
+          </a:p>
+          <a:p>
+            <a:pPr lvl="1"/>
+            <a:r>
+              <a:rPr lang="en-GB" dirty="0" smtClean="0"/>
+              <a:t>How can you improve the implementation in an object oriented manner?</a:t>
+            </a:r>
+          </a:p>
+          <a:p>
+            <a:pPr lvl="1"/>
+            <a:r>
+              <a:rPr lang="en-GB" dirty="0" smtClean="0"/>
+              <a:t>What kind of properties would be nice to have:</a:t>
+            </a:r>
+          </a:p>
+          <a:p>
+            <a:pPr lvl="2"/>
+            <a:r>
+              <a:rPr lang="en-GB" dirty="0" smtClean="0"/>
+              <a:t>the length of the DNA, is a Helicase bound to the DNA, at which positions are the Helicase and/or Polymerase on the DNA and so on ….</a:t>
+            </a:r>
+          </a:p>
+          <a:p>
+            <a:r>
+              <a:rPr lang="en-GB" dirty="0" smtClean="0"/>
+              <a:t>Literature:</a:t>
+            </a:r>
+          </a:p>
+          <a:p>
+            <a:pPr lvl="1"/>
+            <a:r>
+              <a:rPr lang="en-GB" dirty="0"/>
+              <a:t>https://</a:t>
+            </a:r>
+            <a:r>
+              <a:rPr lang="en-GB" dirty="0" smtClean="0"/>
+              <a:t>en.wikipedia.org/wiki/DNA_replication</a:t>
+            </a:r>
+          </a:p>
+          <a:p>
+            <a:pPr lvl="1"/>
+            <a:r>
+              <a:rPr lang="en-GB" dirty="0"/>
+              <a:t>http://</a:t>
+            </a:r>
+            <a:r>
+              <a:rPr lang="en-GB" dirty="0" smtClean="0"/>
+              <a:t>biowiki.ucdavis.edu/Core/Genetics/ -&gt; </a:t>
+            </a:r>
+            <a:r>
+              <a:rPr lang="en-GB" dirty="0"/>
+              <a:t>Unit </a:t>
+            </a:r>
+            <a:r>
+              <a:rPr lang="en-GB" dirty="0" smtClean="0"/>
+              <a:t>II -&gt; Replication in Yeast</a:t>
+            </a:r>
+          </a:p>
+          <a:p>
+            <a:pPr lvl="1"/>
+            <a:r>
+              <a:rPr lang="en-GB" dirty="0"/>
+              <a:t>http://dnareplication.cshl.edu/content/free/chapters/32_newlon.pdf</a:t>
+            </a:r>
+            <a:endParaRPr lang="en-GB" dirty="0" smtClean="0"/>
+          </a:p>
+          <a:p>
+            <a:pPr lvl="1"/>
+            <a:endParaRPr lang="en-GB" dirty="0" smtClean="0"/>
+          </a:p>
+          <a:p>
+            <a:pPr lvl="1"/>
+            <a:endParaRPr lang="en-GB" dirty="0"/>
+          </a:p>
+        </p:txBody>
+      </p:sp>
+      <p:pic>
+        <p:nvPicPr>
+          <p:cNvPr id="5" name="Grafik 4"/>
+          <p:cNvPicPr>
+            <a:picLocks noChangeAspect="1"/>
+          </p:cNvPicPr>
+          <p:nvPr/>
+        </p:nvPicPr>
+        <p:blipFill>
+          <a:blip r:embed="rId2">
+            <a:extLst>
+              <a:ext uri="{28A0092B-C50C-407E-A947-70E740481C1C}">
+                <a14:useLocalDpi xmlns:a14="http://schemas.microsoft.com/office/drawing/2010/main" val="0"/>
+              </a:ext>
+            </a:extLst>
+          </a:blip>
+          <a:stretch>
+            <a:fillRect/>
+          </a:stretch>
+        </p:blipFill>
+        <p:spPr>
+          <a:xfrm>
+            <a:off x="7712075" y="284956"/>
+            <a:ext cx="3067050" cy="1485900"/>
+          </a:xfrm>
+          <a:prstGeom prst="rect">
+            <a:avLst/>
+          </a:prstGeom>
+        </p:spPr>
+      </p:pic>
+    </p:spTree>
+    <p:extLst>
+      <p:ext uri="{BB962C8B-B14F-4D97-AF65-F5344CB8AC3E}">
+        <p14:creationId xmlns:p14="http://schemas.microsoft.com/office/powerpoint/2010/main" val="869947298"/>
+      </p:ext>
+    </p:extLst>
+  </p:cSld>
+  <p:clrMapOvr>
+    <a:masterClrMapping/>
+  </p:clrMapOvr>
+  <p:timing>
+    <p:tnLst>
+      <p:par>
+        <p:cTn id="1" dur="indefinite" restart="never" nodeType="tmRoot"/>
+      </p:par>
+    </p:tnLst>
+  </p:timing>
 </p:sld>
 </file>
 

</xml_diff>